<commit_message>
Briefing update and demo now with input and output
</commit_message>
<xml_diff>
--- a/src/WellBehavedRobot.pptx
+++ b/src/WellBehavedRobot.pptx
@@ -1,18 +1,19 @@
 
 <file path=ppt/presentation.xml><?xml version="1.0" encoding="utf-8"?>
-<p:presentation xmlns:a="http://schemas.openxmlformats.org/drawingml/2006/main" xmlns:r="http://schemas.openxmlformats.org/officeDocument/2006/relationships" xmlns:mc="http://schemas.openxmlformats.org/markup-compatibility/2006" xmlns:mv="urn:schemas-microsoft-com:mac:vml" xmlns:p="http://schemas.openxmlformats.org/presentationml/2006/main" mc:Ignorable="mv" mc:PreserveAttributes="mv:*" saveSubsetFonts="1" autoCompressPictures="0">
+<p:presentation xmlns:a="http://schemas.openxmlformats.org/drawingml/2006/main" xmlns:r="http://schemas.openxmlformats.org/officeDocument/2006/relationships" xmlns:p="http://schemas.openxmlformats.org/presentationml/2006/main" saveSubsetFonts="1" autoCompressPictures="0">
   <p:sldMasterIdLst>
     <p:sldMasterId id="2147483843" r:id="rId1"/>
   </p:sldMasterIdLst>
   <p:sldIdLst>
     <p:sldId id="256" r:id="rId2"/>
-    <p:sldId id="257" r:id="rId3"/>
+    <p:sldId id="266" r:id="rId3"/>
     <p:sldId id="258" r:id="rId4"/>
-    <p:sldId id="259" r:id="rId5"/>
-    <p:sldId id="260" r:id="rId6"/>
-    <p:sldId id="263" r:id="rId7"/>
-    <p:sldId id="262" r:id="rId8"/>
-    <p:sldId id="264" r:id="rId9"/>
+    <p:sldId id="257" r:id="rId5"/>
+    <p:sldId id="267" r:id="rId6"/>
+    <p:sldId id="259" r:id="rId7"/>
+    <p:sldId id="260" r:id="rId8"/>
+    <p:sldId id="263" r:id="rId9"/>
+    <p:sldId id="264" r:id="rId10"/>
   </p:sldIdLst>
   <p:sldSz cx="9144000" cy="6858000" type="screen4x3"/>
   <p:notesSz cx="6858000" cy="9144000"/>
@@ -115,7 +116,7 @@
 </file>
 
 <file path=ppt/slideLayouts/slideLayout1.xml><?xml version="1.0" encoding="utf-8"?>
-<p:sldLayout xmlns:a="http://schemas.openxmlformats.org/drawingml/2006/main" xmlns:r="http://schemas.openxmlformats.org/officeDocument/2006/relationships" xmlns:mc="http://schemas.openxmlformats.org/markup-compatibility/2006" xmlns:mv="urn:schemas-microsoft-com:mac:vml" xmlns:p="http://schemas.openxmlformats.org/presentationml/2006/main" mc:Ignorable="mv" mc:PreserveAttributes="mv:*" type="title" preserve="1">
+<p:sldLayout xmlns:a="http://schemas.openxmlformats.org/drawingml/2006/main" xmlns:r="http://schemas.openxmlformats.org/officeDocument/2006/relationships" xmlns:p="http://schemas.openxmlformats.org/presentationml/2006/main" type="title" preserve="1">
   <p:cSld name="Title Slide">
     <p:bg>
       <p:bgRef idx="1003">
@@ -345,7 +346,7 @@
           <a:p>
             <a:fld id="{72C849C3-ADF3-A34A-90B1-ED75EF07A952}" type="datetimeFigureOut">
               <a:rPr lang="en-US" smtClean="0"/>
-              <a:t>12/10/12</a:t>
+              <a:t>12/11/2012</a:t>
             </a:fld>
             <a:endParaRPr lang="en-US"/>
           </a:p>
@@ -403,7 +404,7 @@
 </file>
 
 <file path=ppt/slideLayouts/slideLayout10.xml><?xml version="1.0" encoding="utf-8"?>
-<p:sldLayout xmlns:a="http://schemas.openxmlformats.org/drawingml/2006/main" xmlns:r="http://schemas.openxmlformats.org/officeDocument/2006/relationships" xmlns:mc="http://schemas.openxmlformats.org/markup-compatibility/2006" xmlns:mv="urn:schemas-microsoft-com:mac:vml" xmlns:p="http://schemas.openxmlformats.org/presentationml/2006/main" mc:Ignorable="mv" mc:PreserveAttributes="mv:*" type="picTx" preserve="1">
+<p:sldLayout xmlns:a="http://schemas.openxmlformats.org/drawingml/2006/main" xmlns:r="http://schemas.openxmlformats.org/officeDocument/2006/relationships" xmlns:p="http://schemas.openxmlformats.org/presentationml/2006/main" type="picTx" preserve="1">
   <p:cSld name="Picture above Caption">
     <p:spTree>
       <p:nvGrpSpPr>
@@ -658,7 +659,7 @@
           <a:p>
             <a:fld id="{72C849C3-ADF3-A34A-90B1-ED75EF07A952}" type="datetimeFigureOut">
               <a:rPr lang="en-US" smtClean="0"/>
-              <a:t>12/10/12</a:t>
+              <a:t>12/11/2012</a:t>
             </a:fld>
             <a:endParaRPr lang="en-US"/>
           </a:p>
@@ -741,7 +742,7 @@
 </file>
 
 <file path=ppt/slideLayouts/slideLayout11.xml><?xml version="1.0" encoding="utf-8"?>
-<p:sldLayout xmlns:a="http://schemas.openxmlformats.org/drawingml/2006/main" xmlns:r="http://schemas.openxmlformats.org/officeDocument/2006/relationships" xmlns:mc="http://schemas.openxmlformats.org/markup-compatibility/2006" xmlns:mv="urn:schemas-microsoft-com:mac:vml" xmlns:p="http://schemas.openxmlformats.org/presentationml/2006/main" mc:Ignorable="mv" mc:PreserveAttributes="mv:*" type="vertTx" preserve="1">
+<p:sldLayout xmlns:a="http://schemas.openxmlformats.org/drawingml/2006/main" xmlns:r="http://schemas.openxmlformats.org/officeDocument/2006/relationships" xmlns:p="http://schemas.openxmlformats.org/presentationml/2006/main" type="vertTx" preserve="1">
   <p:cSld name="Title and Vertical Text">
     <p:spTree>
       <p:nvGrpSpPr>
@@ -849,7 +850,7 @@
           <a:p>
             <a:fld id="{72C849C3-ADF3-A34A-90B1-ED75EF07A952}" type="datetimeFigureOut">
               <a:rPr lang="en-US" smtClean="0"/>
-              <a:t>12/10/12</a:t>
+              <a:t>12/11/2012</a:t>
             </a:fld>
             <a:endParaRPr lang="en-US"/>
           </a:p>
@@ -932,7 +933,7 @@
 </file>
 
 <file path=ppt/slideLayouts/slideLayout12.xml><?xml version="1.0" encoding="utf-8"?>
-<p:sldLayout xmlns:a="http://schemas.openxmlformats.org/drawingml/2006/main" xmlns:r="http://schemas.openxmlformats.org/officeDocument/2006/relationships" xmlns:mc="http://schemas.openxmlformats.org/markup-compatibility/2006" xmlns:mv="urn:schemas-microsoft-com:mac:vml" xmlns:p="http://schemas.openxmlformats.org/presentationml/2006/main" mc:Ignorable="mv" mc:PreserveAttributes="mv:*" type="vertTitleAndTx" preserve="1">
+<p:sldLayout xmlns:a="http://schemas.openxmlformats.org/drawingml/2006/main" xmlns:r="http://schemas.openxmlformats.org/officeDocument/2006/relationships" xmlns:p="http://schemas.openxmlformats.org/presentationml/2006/main" type="vertTitleAndTx" preserve="1">
   <p:cSld name="Vertical Title and Text">
     <p:spTree>
       <p:nvGrpSpPr>
@@ -1050,7 +1051,7 @@
           <a:p>
             <a:fld id="{72C849C3-ADF3-A34A-90B1-ED75EF07A952}" type="datetimeFigureOut">
               <a:rPr lang="en-US" smtClean="0"/>
-              <a:t>12/10/12</a:t>
+              <a:t>12/11/2012</a:t>
             </a:fld>
             <a:endParaRPr lang="en-US"/>
           </a:p>
@@ -1133,7 +1134,7 @@
 </file>
 
 <file path=ppt/slideLayouts/slideLayout2.xml><?xml version="1.0" encoding="utf-8"?>
-<p:sldLayout xmlns:a="http://schemas.openxmlformats.org/drawingml/2006/main" xmlns:r="http://schemas.openxmlformats.org/officeDocument/2006/relationships" xmlns:mc="http://schemas.openxmlformats.org/markup-compatibility/2006" xmlns:mv="urn:schemas-microsoft-com:mac:vml" xmlns:p="http://schemas.openxmlformats.org/presentationml/2006/main" mc:Ignorable="mv" mc:PreserveAttributes="mv:*" type="obj" preserve="1">
+<p:sldLayout xmlns:a="http://schemas.openxmlformats.org/drawingml/2006/main" xmlns:r="http://schemas.openxmlformats.org/officeDocument/2006/relationships" xmlns:p="http://schemas.openxmlformats.org/presentationml/2006/main" type="obj" preserve="1">
   <p:cSld name="Title and Content">
     <p:spTree>
       <p:nvGrpSpPr>
@@ -1241,7 +1242,7 @@
           <a:p>
             <a:fld id="{72C849C3-ADF3-A34A-90B1-ED75EF07A952}" type="datetimeFigureOut">
               <a:rPr lang="en-US" smtClean="0"/>
-              <a:t>12/10/12</a:t>
+              <a:t>12/11/2012</a:t>
             </a:fld>
             <a:endParaRPr lang="en-US"/>
           </a:p>
@@ -1324,7 +1325,7 @@
 </file>
 
 <file path=ppt/slideLayouts/slideLayout3.xml><?xml version="1.0" encoding="utf-8"?>
-<p:sldLayout xmlns:a="http://schemas.openxmlformats.org/drawingml/2006/main" xmlns:r="http://schemas.openxmlformats.org/officeDocument/2006/relationships" xmlns:mc="http://schemas.openxmlformats.org/markup-compatibility/2006" xmlns:mv="urn:schemas-microsoft-com:mac:vml" xmlns:p="http://schemas.openxmlformats.org/presentationml/2006/main" mc:Ignorable="mv" mc:PreserveAttributes="mv:*" type="secHead" preserve="1">
+<p:sldLayout xmlns:a="http://schemas.openxmlformats.org/drawingml/2006/main" xmlns:r="http://schemas.openxmlformats.org/officeDocument/2006/relationships" xmlns:p="http://schemas.openxmlformats.org/presentationml/2006/main" type="secHead" preserve="1">
   <p:cSld name="Section Header">
     <p:spTree>
       <p:nvGrpSpPr>
@@ -1511,7 +1512,7 @@
           <a:p>
             <a:fld id="{72C849C3-ADF3-A34A-90B1-ED75EF07A952}" type="datetimeFigureOut">
               <a:rPr lang="en-US" smtClean="0"/>
-              <a:t>12/10/12</a:t>
+              <a:t>12/11/2012</a:t>
             </a:fld>
             <a:endParaRPr lang="en-US"/>
           </a:p>
@@ -1592,7 +1593,7 @@
 </file>
 
 <file path=ppt/slideLayouts/slideLayout4.xml><?xml version="1.0" encoding="utf-8"?>
-<p:sldLayout xmlns:a="http://schemas.openxmlformats.org/drawingml/2006/main" xmlns:r="http://schemas.openxmlformats.org/officeDocument/2006/relationships" xmlns:mc="http://schemas.openxmlformats.org/markup-compatibility/2006" xmlns:mv="urn:schemas-microsoft-com:mac:vml" xmlns:p="http://schemas.openxmlformats.org/presentationml/2006/main" mc:Ignorable="mv" mc:PreserveAttributes="mv:*" type="twoObj" preserve="1">
+<p:sldLayout xmlns:a="http://schemas.openxmlformats.org/drawingml/2006/main" xmlns:r="http://schemas.openxmlformats.org/officeDocument/2006/relationships" xmlns:p="http://schemas.openxmlformats.org/presentationml/2006/main" type="twoObj" preserve="1">
   <p:cSld name="Two Content">
     <p:spTree>
       <p:nvGrpSpPr>
@@ -1822,7 +1823,7 @@
           <a:p>
             <a:fld id="{72C849C3-ADF3-A34A-90B1-ED75EF07A952}" type="datetimeFigureOut">
               <a:rPr lang="en-US" smtClean="0"/>
-              <a:t>12/10/12</a:t>
+              <a:t>12/11/2012</a:t>
             </a:fld>
             <a:endParaRPr lang="en-US"/>
           </a:p>
@@ -1905,7 +1906,7 @@
 </file>
 
 <file path=ppt/slideLayouts/slideLayout5.xml><?xml version="1.0" encoding="utf-8"?>
-<p:sldLayout xmlns:a="http://schemas.openxmlformats.org/drawingml/2006/main" xmlns:r="http://schemas.openxmlformats.org/officeDocument/2006/relationships" xmlns:mc="http://schemas.openxmlformats.org/markup-compatibility/2006" xmlns:mv="urn:schemas-microsoft-com:mac:vml" xmlns:p="http://schemas.openxmlformats.org/presentationml/2006/main" mc:Ignorable="mv" mc:PreserveAttributes="mv:*" type="twoTxTwoObj" preserve="1">
+<p:sldLayout xmlns:a="http://schemas.openxmlformats.org/drawingml/2006/main" xmlns:r="http://schemas.openxmlformats.org/officeDocument/2006/relationships" xmlns:p="http://schemas.openxmlformats.org/presentationml/2006/main" type="twoTxTwoObj" preserve="1">
   <p:cSld name="Comparison">
     <p:spTree>
       <p:nvGrpSpPr>
@@ -2283,7 +2284,7 @@
           <a:p>
             <a:fld id="{72C849C3-ADF3-A34A-90B1-ED75EF07A952}" type="datetimeFigureOut">
               <a:rPr lang="en-US" smtClean="0"/>
-              <a:t>12/10/12</a:t>
+              <a:t>12/11/2012</a:t>
             </a:fld>
             <a:endParaRPr lang="en-US"/>
           </a:p>
@@ -2366,7 +2367,7 @@
 </file>
 
 <file path=ppt/slideLayouts/slideLayout6.xml><?xml version="1.0" encoding="utf-8"?>
-<p:sldLayout xmlns:a="http://schemas.openxmlformats.org/drawingml/2006/main" xmlns:r="http://schemas.openxmlformats.org/officeDocument/2006/relationships" xmlns:mc="http://schemas.openxmlformats.org/markup-compatibility/2006" xmlns:mv="urn:schemas-microsoft-com:mac:vml" xmlns:p="http://schemas.openxmlformats.org/presentationml/2006/main" mc:Ignorable="mv" mc:PreserveAttributes="mv:*" type="titleOnly" preserve="1">
+<p:sldLayout xmlns:a="http://schemas.openxmlformats.org/drawingml/2006/main" xmlns:r="http://schemas.openxmlformats.org/officeDocument/2006/relationships" xmlns:p="http://schemas.openxmlformats.org/presentationml/2006/main" type="titleOnly" preserve="1">
   <p:cSld name="Title Only">
     <p:spTree>
       <p:nvGrpSpPr>
@@ -2422,7 +2423,7 @@
           <a:p>
             <a:fld id="{72C849C3-ADF3-A34A-90B1-ED75EF07A952}" type="datetimeFigureOut">
               <a:rPr lang="en-US" smtClean="0"/>
-              <a:t>12/10/12</a:t>
+              <a:t>12/11/2012</a:t>
             </a:fld>
             <a:endParaRPr lang="en-US"/>
           </a:p>
@@ -2505,7 +2506,7 @@
 </file>
 
 <file path=ppt/slideLayouts/slideLayout7.xml><?xml version="1.0" encoding="utf-8"?>
-<p:sldLayout xmlns:a="http://schemas.openxmlformats.org/drawingml/2006/main" xmlns:r="http://schemas.openxmlformats.org/officeDocument/2006/relationships" xmlns:mc="http://schemas.openxmlformats.org/markup-compatibility/2006" xmlns:mv="urn:schemas-microsoft-com:mac:vml" xmlns:p="http://schemas.openxmlformats.org/presentationml/2006/main" mc:Ignorable="mv" mc:PreserveAttributes="mv:*" type="blank" preserve="1">
+<p:sldLayout xmlns:a="http://schemas.openxmlformats.org/drawingml/2006/main" xmlns:r="http://schemas.openxmlformats.org/officeDocument/2006/relationships" xmlns:p="http://schemas.openxmlformats.org/presentationml/2006/main" type="blank" preserve="1">
   <p:cSld name="Blank">
     <p:spTree>
       <p:nvGrpSpPr>
@@ -2538,7 +2539,7 @@
           <a:p>
             <a:fld id="{72C849C3-ADF3-A34A-90B1-ED75EF07A952}" type="datetimeFigureOut">
               <a:rPr lang="en-US" smtClean="0"/>
-              <a:t>12/10/12</a:t>
+              <a:t>12/11/2012</a:t>
             </a:fld>
             <a:endParaRPr lang="en-US"/>
           </a:p>
@@ -2595,7 +2596,7 @@
 </file>
 
 <file path=ppt/slideLayouts/slideLayout8.xml><?xml version="1.0" encoding="utf-8"?>
-<p:sldLayout xmlns:a="http://schemas.openxmlformats.org/drawingml/2006/main" xmlns:r="http://schemas.openxmlformats.org/officeDocument/2006/relationships" xmlns:mc="http://schemas.openxmlformats.org/markup-compatibility/2006" xmlns:mv="urn:schemas-microsoft-com:mac:vml" xmlns:p="http://schemas.openxmlformats.org/presentationml/2006/main" mc:Ignorable="mv" mc:PreserveAttributes="mv:*" type="objTx" preserve="1">
+<p:sldLayout xmlns:a="http://schemas.openxmlformats.org/drawingml/2006/main" xmlns:r="http://schemas.openxmlformats.org/officeDocument/2006/relationships" xmlns:p="http://schemas.openxmlformats.org/presentationml/2006/main" type="objTx" preserve="1">
   <p:cSld name="Content with Caption">
     <p:spTree>
       <p:nvGrpSpPr>
@@ -2817,7 +2818,7 @@
           <a:p>
             <a:fld id="{72C849C3-ADF3-A34A-90B1-ED75EF07A952}" type="datetimeFigureOut">
               <a:rPr lang="en-US" smtClean="0"/>
-              <a:t>12/10/12</a:t>
+              <a:t>12/11/2012</a:t>
             </a:fld>
             <a:endParaRPr lang="en-US"/>
           </a:p>
@@ -2900,7 +2901,7 @@
 </file>
 
 <file path=ppt/slideLayouts/slideLayout9.xml><?xml version="1.0" encoding="utf-8"?>
-<p:sldLayout xmlns:a="http://schemas.openxmlformats.org/drawingml/2006/main" xmlns:r="http://schemas.openxmlformats.org/officeDocument/2006/relationships" xmlns:mc="http://schemas.openxmlformats.org/markup-compatibility/2006" xmlns:mv="urn:schemas-microsoft-com:mac:vml" xmlns:p="http://schemas.openxmlformats.org/presentationml/2006/main" mc:Ignorable="mv" mc:PreserveAttributes="mv:*" type="picTx" preserve="1">
+<p:sldLayout xmlns:a="http://schemas.openxmlformats.org/drawingml/2006/main" xmlns:r="http://schemas.openxmlformats.org/officeDocument/2006/relationships" xmlns:p="http://schemas.openxmlformats.org/presentationml/2006/main" type="picTx" preserve="1">
   <p:cSld name="Picture with Caption">
     <p:spTree>
       <p:nvGrpSpPr>
@@ -3152,7 +3153,7 @@
           <a:p>
             <a:fld id="{72C849C3-ADF3-A34A-90B1-ED75EF07A952}" type="datetimeFigureOut">
               <a:rPr lang="en-US" smtClean="0"/>
-              <a:t>12/10/12</a:t>
+              <a:t>12/11/2012</a:t>
             </a:fld>
             <a:endParaRPr lang="en-US"/>
           </a:p>
@@ -3235,7 +3236,7 @@
 </file>
 
 <file path=ppt/slideMasters/slideMaster1.xml><?xml version="1.0" encoding="utf-8"?>
-<p:sldMaster xmlns:a="http://schemas.openxmlformats.org/drawingml/2006/main" xmlns:r="http://schemas.openxmlformats.org/officeDocument/2006/relationships" xmlns:mc="http://schemas.openxmlformats.org/markup-compatibility/2006" xmlns:mv="urn:schemas-microsoft-com:mac:vml" xmlns:p="http://schemas.openxmlformats.org/presentationml/2006/main" mc:Ignorable="mv" mc:PreserveAttributes="mv:*">
+<p:sldMaster xmlns:a="http://schemas.openxmlformats.org/drawingml/2006/main" xmlns:r="http://schemas.openxmlformats.org/officeDocument/2006/relationships" xmlns:p="http://schemas.openxmlformats.org/presentationml/2006/main">
   <p:cSld>
     <p:bg>
       <p:bgRef idx="1002">
@@ -3428,7 +3429,7 @@
           <a:p>
             <a:fld id="{72C849C3-ADF3-A34A-90B1-ED75EF07A952}" type="datetimeFigureOut">
               <a:rPr lang="en-US" smtClean="0"/>
-              <a:t>12/10/12</a:t>
+              <a:t>12/11/2012</a:t>
             </a:fld>
             <a:endParaRPr lang="en-US"/>
           </a:p>
@@ -3768,7 +3769,7 @@
 </file>
 
 <file path=ppt/slides/slide1.xml><?xml version="1.0" encoding="utf-8"?>
-<p:sld xmlns:a="http://schemas.openxmlformats.org/drawingml/2006/main" xmlns:r="http://schemas.openxmlformats.org/officeDocument/2006/relationships" xmlns:mc="http://schemas.openxmlformats.org/markup-compatibility/2006" xmlns:mv="urn:schemas-microsoft-com:mac:vml" xmlns:p="http://schemas.openxmlformats.org/presentationml/2006/main" mc:Ignorable="mv" mc:PreserveAttributes="mv:*">
+<p:sld xmlns:a="http://schemas.openxmlformats.org/drawingml/2006/main" xmlns:r="http://schemas.openxmlformats.org/officeDocument/2006/relationships" xmlns:p="http://schemas.openxmlformats.org/presentationml/2006/main">
   <p:cSld>
     <p:spTree>
       <p:nvGrpSpPr>
@@ -3857,7 +3858,7 @@
 </file>
 
 <file path=ppt/slides/slide2.xml><?xml version="1.0" encoding="utf-8"?>
-<p:sld xmlns:a="http://schemas.openxmlformats.org/drawingml/2006/main" xmlns:r="http://schemas.openxmlformats.org/officeDocument/2006/relationships" xmlns:mc="http://schemas.openxmlformats.org/markup-compatibility/2006" xmlns:mv="urn:schemas-microsoft-com:mac:vml" xmlns:p="http://schemas.openxmlformats.org/presentationml/2006/main" mc:Ignorable="mv" mc:PreserveAttributes="mv:*">
+<p:sld xmlns:a="http://schemas.openxmlformats.org/drawingml/2006/main" xmlns:r="http://schemas.openxmlformats.org/officeDocument/2006/relationships" xmlns:p="http://schemas.openxmlformats.org/presentationml/2006/main">
   <p:cSld>
     <p:spTree>
       <p:nvGrpSpPr>
@@ -3890,7 +3891,7 @@
           <a:p>
             <a:r>
               <a:rPr lang="en-US" dirty="0" smtClean="0"/>
-              <a:t>Neural Network</a:t>
+              <a:t>A Neuron</a:t>
             </a:r>
             <a:endParaRPr lang="en-US" dirty="0"/>
           </a:p>
@@ -3898,67 +3899,80 @@
       </p:sp>
       <p:pic>
         <p:nvPicPr>
-          <p:cNvPr id="4" name="Picture 3"/>
+          <p:cNvPr id="1026" name="Picture 2" descr="http://www.fico.com/en/Communities/Analytic-Technologies/PublishingImages/figure-20-page-63.jpg"/>
           <p:cNvPicPr>
-            <a:picLocks noChangeAspect="1"/>
+            <a:picLocks noChangeAspect="1" noChangeArrowheads="1"/>
           </p:cNvPicPr>
           <p:nvPr/>
         </p:nvPicPr>
         <p:blipFill>
-          <a:blip r:embed="rId2"/>
+          <a:blip r:embed="rId2">
+            <a:extLst>
+              <a:ext uri="{28A0092B-C50C-407E-A947-70E740481C1C}">
+                <a14:useLocalDpi xmlns:a14="http://schemas.microsoft.com/office/drawing/2010/main" val="0"/>
+              </a:ext>
+            </a:extLst>
+          </a:blip>
+          <a:srcRect/>
           <a:stretch>
             <a:fillRect/>
           </a:stretch>
         </p:blipFill>
-        <p:spPr>
-          <a:xfrm>
-            <a:off x="2098387" y="1939967"/>
-            <a:ext cx="4761638" cy="4484560"/>
-          </a:xfrm>
-          <a:prstGeom prst="rect">
-            <a:avLst/>
-          </a:prstGeom>
-        </p:spPr>
-      </p:pic>
-      <p:sp>
-        <p:nvSpPr>
-          <p:cNvPr id="5" name="TextBox 4"/>
-          <p:cNvSpPr txBox="1"/>
-          <p:nvPr/>
-        </p:nvSpPr>
-        <p:spPr>
-          <a:xfrm>
-            <a:off x="4709110" y="6563026"/>
-            <a:ext cx="4301830" cy="276999"/>
+        <p:spPr bwMode="auto">
+          <a:xfrm>
+            <a:off x="2428259" y="2288049"/>
+            <a:ext cx="4362450" cy="3124201"/>
           </a:xfrm>
           <a:prstGeom prst="rect">
             <a:avLst/>
           </a:prstGeom>
           <a:noFill/>
-        </p:spPr>
-        <p:txBody>
-          <a:bodyPr wrap="square" rtlCol="0">
+          <a:extLst>
+            <a:ext uri="{909E8E84-426E-40DD-AFC4-6F175D3DCCD1}">
+              <a14:hiddenFill xmlns:a14="http://schemas.microsoft.com/office/drawing/2010/main">
+                <a:solidFill>
+                  <a:srgbClr val="FFFFFF"/>
+                </a:solidFill>
+              </a14:hiddenFill>
+            </a:ext>
+          </a:extLst>
+        </p:spPr>
+      </p:pic>
+      <p:sp>
+        <p:nvSpPr>
+          <p:cNvPr id="4" name="TextBox 3"/>
+          <p:cNvSpPr txBox="1"/>
+          <p:nvPr/>
+        </p:nvSpPr>
+        <p:spPr>
+          <a:xfrm>
+            <a:off x="1655730" y="6396655"/>
+            <a:ext cx="7182159" cy="307777"/>
+          </a:xfrm>
+          <a:prstGeom prst="rect">
+            <a:avLst/>
+          </a:prstGeom>
+          <a:noFill/>
+        </p:spPr>
+        <p:txBody>
+          <a:bodyPr wrap="none" rtlCol="0">
             <a:spAutoFit/>
           </a:bodyPr>
           <a:lstStyle/>
           <a:p>
             <a:r>
-              <a:rPr lang="en-US" sz="1200" dirty="0" smtClean="0"/>
-              <a:t>https://</a:t>
-            </a:r>
-            <a:r>
-              <a:rPr lang="en-US" sz="1200" dirty="0" err="1" smtClean="0"/>
-              <a:t>www.ibm.com/developerworks/library/l</a:t>
-            </a:r>
-            <a:r>
-              <a:rPr lang="en-US" sz="1200" dirty="0" smtClean="0"/>
-              <a:t>-neural/</a:t>
-            </a:r>
-            <a:endParaRPr lang="en-US" sz="1200" dirty="0"/>
+              <a:rPr lang="en-US" sz="1400" dirty="0"/>
+              <a:t>http://www.fico.com/en/Communities/analytic-technologies/Pages/NeuralNetworks.aspx</a:t>
+            </a:r>
           </a:p>
         </p:txBody>
       </p:sp>
     </p:spTree>
+    <p:extLst>
+      <p:ext uri="{BB962C8B-B14F-4D97-AF65-F5344CB8AC3E}">
+        <p14:creationId xmlns:p14="http://schemas.microsoft.com/office/powerpoint/2010/main" val="1893869293"/>
+      </p:ext>
+    </p:extLst>
   </p:cSld>
   <p:clrMapOvr>
     <a:masterClrMapping/>
@@ -3967,7 +3981,7 @@
 </file>
 
 <file path=ppt/slides/slide3.xml><?xml version="1.0" encoding="utf-8"?>
-<p:sld xmlns:a="http://schemas.openxmlformats.org/drawingml/2006/main" xmlns:r="http://schemas.openxmlformats.org/officeDocument/2006/relationships" xmlns:mc="http://schemas.openxmlformats.org/markup-compatibility/2006" xmlns:mv="urn:schemas-microsoft-com:mac:vml" xmlns:p="http://schemas.openxmlformats.org/presentationml/2006/main" mc:Ignorable="mv" mc:PreserveAttributes="mv:*">
+<p:sld xmlns:a="http://schemas.openxmlformats.org/drawingml/2006/main" xmlns:r="http://schemas.openxmlformats.org/officeDocument/2006/relationships" xmlns:p="http://schemas.openxmlformats.org/presentationml/2006/main">
   <p:cSld>
     <p:spTree>
       <p:nvGrpSpPr>
@@ -4030,6 +4044,35 @@
           </a:prstGeom>
         </p:spPr>
       </p:pic>
+      <p:sp>
+        <p:nvSpPr>
+          <p:cNvPr id="3" name="TextBox 2"/>
+          <p:cNvSpPr txBox="1"/>
+          <p:nvPr/>
+        </p:nvSpPr>
+        <p:spPr>
+          <a:xfrm>
+            <a:off x="5459152" y="6455831"/>
+            <a:ext cx="3559244" cy="369332"/>
+          </a:xfrm>
+          <a:prstGeom prst="rect">
+            <a:avLst/>
+          </a:prstGeom>
+          <a:noFill/>
+        </p:spPr>
+        <p:txBody>
+          <a:bodyPr wrap="none" rtlCol="0">
+            <a:spAutoFit/>
+          </a:bodyPr>
+          <a:lstStyle/>
+          <a:p>
+            <a:r>
+              <a:rPr lang="en-US" dirty="0"/>
+              <a:t>http://www.atwebo.com/ann.htm</a:t>
+            </a:r>
+          </a:p>
+        </p:txBody>
+      </p:sp>
     </p:spTree>
   </p:cSld>
   <p:clrMapOvr>
@@ -4039,7 +4082,7 @@
 </file>
 
 <file path=ppt/slides/slide4.xml><?xml version="1.0" encoding="utf-8"?>
-<p:sld xmlns:a="http://schemas.openxmlformats.org/drawingml/2006/main" xmlns:r="http://schemas.openxmlformats.org/officeDocument/2006/relationships" xmlns:mc="http://schemas.openxmlformats.org/markup-compatibility/2006" xmlns:mv="urn:schemas-microsoft-com:mac:vml" xmlns:p="http://schemas.openxmlformats.org/presentationml/2006/main" mc:Ignorable="mv" mc:PreserveAttributes="mv:*">
+<p:sld xmlns:a="http://schemas.openxmlformats.org/drawingml/2006/main" xmlns:r="http://schemas.openxmlformats.org/officeDocument/2006/relationships" xmlns:p="http://schemas.openxmlformats.org/presentationml/2006/main">
   <p:cSld>
     <p:spTree>
       <p:nvGrpSpPr>
@@ -4072,58 +4115,71 @@
           <a:p>
             <a:r>
               <a:rPr lang="en-US" dirty="0" smtClean="0"/>
-              <a:t>The Well Behaved Robot</a:t>
+              <a:t>Neural Network</a:t>
             </a:r>
             <a:endParaRPr lang="en-US" dirty="0"/>
           </a:p>
         </p:txBody>
       </p:sp>
-      <p:sp>
-        <p:nvSpPr>
-          <p:cNvPr id="3" name="Content Placeholder 2"/>
-          <p:cNvSpPr>
-            <a:spLocks noGrp="1"/>
-          </p:cNvSpPr>
-          <p:nvPr>
-            <p:ph idx="1"/>
-          </p:nvPr>
-        </p:nvSpPr>
-        <p:spPr/>
-        <p:txBody>
-          <a:bodyPr>
-            <a:normAutofit fontScale="85000" lnSpcReduction="10000"/>
+      <p:pic>
+        <p:nvPicPr>
+          <p:cNvPr id="4" name="Picture 3"/>
+          <p:cNvPicPr>
+            <a:picLocks noChangeAspect="1"/>
+          </p:cNvPicPr>
+          <p:nvPr/>
+        </p:nvPicPr>
+        <p:blipFill>
+          <a:blip r:embed="rId2"/>
+          <a:stretch>
+            <a:fillRect/>
+          </a:stretch>
+        </p:blipFill>
+        <p:spPr>
+          <a:xfrm>
+            <a:off x="2098387" y="1939967"/>
+            <a:ext cx="4761638" cy="4484560"/>
+          </a:xfrm>
+          <a:prstGeom prst="rect">
+            <a:avLst/>
+          </a:prstGeom>
+        </p:spPr>
+      </p:pic>
+      <p:sp>
+        <p:nvSpPr>
+          <p:cNvPr id="5" name="TextBox 4"/>
+          <p:cNvSpPr txBox="1"/>
+          <p:nvPr/>
+        </p:nvSpPr>
+        <p:spPr>
+          <a:xfrm>
+            <a:off x="4709110" y="6563026"/>
+            <a:ext cx="4301830" cy="276999"/>
+          </a:xfrm>
+          <a:prstGeom prst="rect">
+            <a:avLst/>
+          </a:prstGeom>
+          <a:noFill/>
+        </p:spPr>
+        <p:txBody>
+          <a:bodyPr wrap="square" rtlCol="0">
+            <a:spAutoFit/>
           </a:bodyPr>
           <a:lstStyle/>
           <a:p>
             <a:r>
-              <a:rPr lang="en-US" dirty="0" smtClean="0"/>
-              <a:t>The robot guards the door to the pool hall in a haunted mansion.</a:t>
-            </a:r>
-          </a:p>
-          <a:p>
-            <a:r>
-              <a:rPr lang="en-US" dirty="0" smtClean="0"/>
-              <a:t>If a human enters greet them politely (adult or child)</a:t>
-            </a:r>
-          </a:p>
-          <a:p>
-            <a:r>
-              <a:rPr lang="en-US" dirty="0" smtClean="0"/>
-              <a:t>If a child enters the room yell for help (children have damaged the felt in the past)</a:t>
-            </a:r>
-          </a:p>
-          <a:p>
-            <a:r>
-              <a:rPr lang="en-US" dirty="0" smtClean="0"/>
-              <a:t>If a vampire enters the room stab it in the heart (real vampires are dangerous parasites no matter what Twilight would have you think) </a:t>
-            </a:r>
-          </a:p>
-          <a:p>
-            <a:r>
-              <a:rPr lang="en-US" dirty="0" smtClean="0"/>
-              <a:t>If a werewolf enters yell for help and run away. (Werewolves have a habit of destroying robots, repairs are costly)</a:t>
-            </a:r>
-            <a:endParaRPr lang="en-US" dirty="0"/>
+              <a:rPr lang="en-US" sz="1200" dirty="0" smtClean="0"/>
+              <a:t>https://</a:t>
+            </a:r>
+            <a:r>
+              <a:rPr lang="en-US" sz="1200" dirty="0" err="1" smtClean="0"/>
+              <a:t>www.ibm.com/developerworks/library/l</a:t>
+            </a:r>
+            <a:r>
+              <a:rPr lang="en-US" sz="1200" dirty="0" smtClean="0"/>
+              <a:t>-neural/</a:t>
+            </a:r>
+            <a:endParaRPr lang="en-US" sz="1200" dirty="0"/>
           </a:p>
         </p:txBody>
       </p:sp>
@@ -4136,7 +4192,259 @@
 </file>
 
 <file path=ppt/slides/slide5.xml><?xml version="1.0" encoding="utf-8"?>
-<p:sld xmlns:a="http://schemas.openxmlformats.org/drawingml/2006/main" xmlns:r="http://schemas.openxmlformats.org/officeDocument/2006/relationships" xmlns:mc="http://schemas.openxmlformats.org/markup-compatibility/2006" xmlns:mv="urn:schemas-microsoft-com:mac:vml" xmlns:p="http://schemas.openxmlformats.org/presentationml/2006/main" mc:Ignorable="mv" mc:PreserveAttributes="mv:*">
+<p:sld xmlns:a="http://schemas.openxmlformats.org/drawingml/2006/main" xmlns:r="http://schemas.openxmlformats.org/officeDocument/2006/relationships" xmlns:p="http://schemas.openxmlformats.org/presentationml/2006/main">
+  <p:cSld>
+    <p:spTree>
+      <p:nvGrpSpPr>
+        <p:cNvPr id="1" name=""/>
+        <p:cNvGrpSpPr/>
+        <p:nvPr/>
+      </p:nvGrpSpPr>
+      <p:grpSpPr>
+        <a:xfrm>
+          <a:off x="0" y="0"/>
+          <a:ext cx="0" cy="0"/>
+          <a:chOff x="0" y="0"/>
+          <a:chExt cx="0" cy="0"/>
+        </a:xfrm>
+      </p:grpSpPr>
+      <p:sp>
+        <p:nvSpPr>
+          <p:cNvPr id="2" name="Title 1"/>
+          <p:cNvSpPr>
+            <a:spLocks noGrp="1"/>
+          </p:cNvSpPr>
+          <p:nvPr>
+            <p:ph type="title"/>
+          </p:nvPr>
+        </p:nvSpPr>
+        <p:spPr/>
+        <p:txBody>
+          <a:bodyPr/>
+          <a:lstStyle/>
+          <a:p>
+            <a:r>
+              <a:rPr lang="en-US" dirty="0" err="1" smtClean="0"/>
+              <a:t>Backpropagation</a:t>
+            </a:r>
+            <a:r>
+              <a:rPr lang="en-US" dirty="0" smtClean="0"/>
+              <a:t> Training</a:t>
+            </a:r>
+            <a:endParaRPr lang="en-US" dirty="0"/>
+          </a:p>
+        </p:txBody>
+      </p:sp>
+      <p:pic>
+        <p:nvPicPr>
+          <p:cNvPr id="2050" name="Picture 2" descr="http://www.nnwj.de/uploads/pics/1_2-backpropagation-net.gif"/>
+          <p:cNvPicPr>
+            <a:picLocks noChangeAspect="1" noChangeArrowheads="1"/>
+          </p:cNvPicPr>
+          <p:nvPr/>
+        </p:nvPicPr>
+        <p:blipFill>
+          <a:blip r:embed="rId2">
+            <a:extLst>
+              <a:ext uri="{28A0092B-C50C-407E-A947-70E740481C1C}">
+                <a14:useLocalDpi xmlns:a14="http://schemas.microsoft.com/office/drawing/2010/main" val="0"/>
+              </a:ext>
+            </a:extLst>
+          </a:blip>
+          <a:srcRect/>
+          <a:stretch>
+            <a:fillRect/>
+          </a:stretch>
+        </p:blipFill>
+        <p:spPr bwMode="auto">
+          <a:xfrm>
+            <a:off x="3449190" y="2418795"/>
+            <a:ext cx="3171825" cy="3419475"/>
+          </a:xfrm>
+          <a:prstGeom prst="rect">
+            <a:avLst/>
+          </a:prstGeom>
+          <a:noFill/>
+          <a:extLst>
+            <a:ext uri="{909E8E84-426E-40DD-AFC4-6F175D3DCCD1}">
+              <a14:hiddenFill xmlns:a14="http://schemas.microsoft.com/office/drawing/2010/main">
+                <a:solidFill>
+                  <a:srgbClr val="FFFFFF"/>
+                </a:solidFill>
+              </a14:hiddenFill>
+            </a:ext>
+          </a:extLst>
+        </p:spPr>
+      </p:pic>
+      <p:sp>
+        <p:nvSpPr>
+          <p:cNvPr id="4" name="TextBox 3"/>
+          <p:cNvSpPr txBox="1"/>
+          <p:nvPr/>
+        </p:nvSpPr>
+        <p:spPr>
+          <a:xfrm>
+            <a:off x="3977196" y="6253410"/>
+            <a:ext cx="4854855" cy="369332"/>
+          </a:xfrm>
+          <a:prstGeom prst="rect">
+            <a:avLst/>
+          </a:prstGeom>
+          <a:noFill/>
+        </p:spPr>
+        <p:txBody>
+          <a:bodyPr wrap="none" rtlCol="0">
+            <a:spAutoFit/>
+          </a:bodyPr>
+          <a:lstStyle/>
+          <a:p>
+            <a:r>
+              <a:rPr lang="en-US" dirty="0"/>
+              <a:t>http://www.nnwj.de/backpropagation-net.html</a:t>
+            </a:r>
+          </a:p>
+        </p:txBody>
+      </p:sp>
+    </p:spTree>
+    <p:extLst>
+      <p:ext uri="{BB962C8B-B14F-4D97-AF65-F5344CB8AC3E}">
+        <p14:creationId xmlns:p14="http://schemas.microsoft.com/office/powerpoint/2010/main" val="2156761762"/>
+      </p:ext>
+    </p:extLst>
+  </p:cSld>
+  <p:clrMapOvr>
+    <a:masterClrMapping/>
+  </p:clrMapOvr>
+</p:sld>
+</file>
+
+<file path=ppt/slides/slide6.xml><?xml version="1.0" encoding="utf-8"?>
+<p:sld xmlns:a="http://schemas.openxmlformats.org/drawingml/2006/main" xmlns:r="http://schemas.openxmlformats.org/officeDocument/2006/relationships" xmlns:p="http://schemas.openxmlformats.org/presentationml/2006/main">
+  <p:cSld>
+    <p:spTree>
+      <p:nvGrpSpPr>
+        <p:cNvPr id="1" name=""/>
+        <p:cNvGrpSpPr/>
+        <p:nvPr/>
+      </p:nvGrpSpPr>
+      <p:grpSpPr>
+        <a:xfrm>
+          <a:off x="0" y="0"/>
+          <a:ext cx="0" cy="0"/>
+          <a:chOff x="0" y="0"/>
+          <a:chExt cx="0" cy="0"/>
+        </a:xfrm>
+      </p:grpSpPr>
+      <p:sp>
+        <p:nvSpPr>
+          <p:cNvPr id="2" name="Title 1"/>
+          <p:cNvSpPr>
+            <a:spLocks noGrp="1"/>
+          </p:cNvSpPr>
+          <p:nvPr>
+            <p:ph type="title"/>
+          </p:nvPr>
+        </p:nvSpPr>
+        <p:spPr/>
+        <p:txBody>
+          <a:bodyPr/>
+          <a:lstStyle/>
+          <a:p>
+            <a:r>
+              <a:rPr lang="en-US" dirty="0" smtClean="0"/>
+              <a:t>The Well Behaved Robot</a:t>
+            </a:r>
+            <a:endParaRPr lang="en-US" dirty="0"/>
+          </a:p>
+        </p:txBody>
+      </p:sp>
+      <p:sp>
+        <p:nvSpPr>
+          <p:cNvPr id="3" name="Content Placeholder 2"/>
+          <p:cNvSpPr>
+            <a:spLocks noGrp="1"/>
+          </p:cNvSpPr>
+          <p:nvPr>
+            <p:ph idx="1"/>
+          </p:nvPr>
+        </p:nvSpPr>
+        <p:spPr/>
+        <p:txBody>
+          <a:bodyPr>
+            <a:normAutofit fontScale="85000" lnSpcReduction="20000"/>
+          </a:bodyPr>
+          <a:lstStyle/>
+          <a:p>
+            <a:r>
+              <a:rPr lang="en-US" dirty="0" smtClean="0"/>
+              <a:t>The robot guards the door to the pool hall in a haunted mansion.</a:t>
+            </a:r>
+          </a:p>
+          <a:p>
+            <a:r>
+              <a:rPr lang="en-US" dirty="0" smtClean="0"/>
+              <a:t>If a human enters greet them politely (adult or child)</a:t>
+            </a:r>
+          </a:p>
+          <a:p>
+            <a:r>
+              <a:rPr lang="en-US" dirty="0" smtClean="0"/>
+              <a:t>If a child enters the room yell for help (children have damaged the felt in the past)</a:t>
+            </a:r>
+          </a:p>
+          <a:p>
+            <a:r>
+              <a:rPr lang="en-US" dirty="0" smtClean="0"/>
+              <a:t>If a vampire enters the room stab it in the heart (real vampires are dangerous parasites no matter what Twilight would have you think) </a:t>
+            </a:r>
+          </a:p>
+          <a:p>
+            <a:r>
+              <a:rPr lang="en-US" dirty="0" smtClean="0"/>
+              <a:t>If a werewolf </a:t>
+            </a:r>
+            <a:r>
+              <a:rPr lang="en-US" dirty="0" smtClean="0"/>
+              <a:t>enters the room </a:t>
+            </a:r>
+            <a:r>
+              <a:rPr lang="en-US" dirty="0" smtClean="0"/>
+              <a:t>yell for help and </a:t>
+            </a:r>
+            <a:r>
+              <a:rPr lang="en-US" dirty="0" smtClean="0"/>
+              <a:t>RUN AWAY</a:t>
+            </a:r>
+            <a:r>
+              <a:rPr lang="en-US" dirty="0" smtClean="0"/>
+              <a:t>. </a:t>
+            </a:r>
+            <a:r>
+              <a:rPr lang="en-US" dirty="0" smtClean="0"/>
+              <a:t>(Werewolves have a habit of destroying </a:t>
+            </a:r>
+            <a:r>
+              <a:rPr lang="en-US" dirty="0" smtClean="0"/>
+              <a:t>robots and the </a:t>
+            </a:r>
+            <a:r>
+              <a:rPr lang="en-US" dirty="0" smtClean="0"/>
+              <a:t>repairs are costly)</a:t>
+            </a:r>
+            <a:endParaRPr lang="en-US" dirty="0"/>
+          </a:p>
+        </p:txBody>
+      </p:sp>
+    </p:spTree>
+  </p:cSld>
+  <p:clrMapOvr>
+    <a:masterClrMapping/>
+  </p:clrMapOvr>
+</p:sld>
+</file>
+
+<file path=ppt/slides/slide7.xml><?xml version="1.0" encoding="utf-8"?>
+<p:sld xmlns:a="http://schemas.openxmlformats.org/drawingml/2006/main" xmlns:r="http://schemas.openxmlformats.org/officeDocument/2006/relationships" xmlns:p="http://schemas.openxmlformats.org/presentationml/2006/main">
   <p:cSld>
     <p:spTree>
       <p:nvGrpSpPr>
@@ -5678,8 +5986,8 @@
 </p:sld>
 </file>
 
-<file path=ppt/slides/slide6.xml><?xml version="1.0" encoding="utf-8"?>
-<p:sld xmlns:a="http://schemas.openxmlformats.org/drawingml/2006/main" xmlns:r="http://schemas.openxmlformats.org/officeDocument/2006/relationships" xmlns:mc="http://schemas.openxmlformats.org/markup-compatibility/2006" xmlns:mv="urn:schemas-microsoft-com:mac:vml" xmlns:p="http://schemas.openxmlformats.org/presentationml/2006/main" mc:Ignorable="mv" mc:PreserveAttributes="mv:*">
+<file path=ppt/slides/slide8.xml><?xml version="1.0" encoding="utf-8"?>
+<p:sld xmlns:a="http://schemas.openxmlformats.org/drawingml/2006/main" xmlns:r="http://schemas.openxmlformats.org/officeDocument/2006/relationships" xmlns:p="http://schemas.openxmlformats.org/presentationml/2006/main">
   <p:cSld>
     <p:spTree>
       <p:nvGrpSpPr>
@@ -5710,32 +6018,74 @@
           <a:bodyPr/>
           <a:lstStyle/>
           <a:p>
-            <a:endParaRPr lang="en-US"/>
+            <a:r>
+              <a:rPr lang="en-US" dirty="0" smtClean="0"/>
+              <a:t>Training Data</a:t>
+            </a:r>
+            <a:endParaRPr lang="en-US" dirty="0"/>
           </a:p>
         </p:txBody>
       </p:sp>
       <p:pic>
         <p:nvPicPr>
-          <p:cNvPr id="5" name="Picture 4" descr="trained_robot_behavior_results.png"/>
+          <p:cNvPr id="3074" name="Picture 2"/>
           <p:cNvPicPr>
-            <a:picLocks noChangeAspect="1"/>
+            <a:picLocks noChangeAspect="1" noChangeArrowheads="1"/>
           </p:cNvPicPr>
           <p:nvPr/>
         </p:nvPicPr>
-        <p:blipFill>
-          <a:blip r:embed="rId2"/>
-          <a:stretch>
-            <a:fillRect/>
-          </a:stretch>
+        <p:blipFill rotWithShape="1">
+          <a:blip r:embed="rId2">
+            <a:extLst>
+              <a:ext uri="{28A0092B-C50C-407E-A947-70E740481C1C}">
+                <a14:useLocalDpi xmlns:a14="http://schemas.microsoft.com/office/drawing/2010/main" val="0"/>
+              </a:ext>
+            </a:extLst>
+          </a:blip>
+          <a:srcRect l="2701" t="7323" r="4235" b="9058"/>
+          <a:stretch/>
         </p:blipFill>
-        <p:spPr>
-          <a:xfrm>
-            <a:off x="0" y="0"/>
-            <a:ext cx="9144000" cy="6858000"/>
+        <p:spPr bwMode="auto">
+          <a:xfrm>
+            <a:off x="1624611" y="1890948"/>
+            <a:ext cx="5921406" cy="4492101"/>
           </a:xfrm>
           <a:prstGeom prst="rect">
             <a:avLst/>
           </a:prstGeom>
+          <a:noFill/>
+          <a:ln>
+            <a:noFill/>
+          </a:ln>
+          <a:effectLst/>
+          <a:extLst>
+            <a:ext uri="{909E8E84-426E-40DD-AFC4-6F175D3DCCD1}">
+              <a14:hiddenFill xmlns:a14="http://schemas.microsoft.com/office/drawing/2010/main">
+                <a:solidFill>
+                  <a:schemeClr val="accent1"/>
+                </a:solidFill>
+              </a14:hiddenFill>
+            </a:ext>
+            <a:ext uri="{91240B29-F687-4F45-9708-019B960494DF}">
+              <a14:hiddenLine xmlns:a14="http://schemas.microsoft.com/office/drawing/2010/main" w="9525">
+                <a:solidFill>
+                  <a:schemeClr val="tx1"/>
+                </a:solidFill>
+                <a:miter lim="800000"/>
+                <a:headEnd/>
+                <a:tailEnd/>
+              </a14:hiddenLine>
+            </a:ext>
+            <a:ext uri="{AF507438-7753-43E0-B8FC-AC1667EBCBE1}">
+              <a14:hiddenEffects xmlns:a14="http://schemas.microsoft.com/office/drawing/2010/main">
+                <a:effectLst>
+                  <a:outerShdw dist="35921" dir="2700000" algn="ctr" rotWithShape="0">
+                    <a:schemeClr val="bg2"/>
+                  </a:outerShdw>
+                </a:effectLst>
+              </a14:hiddenEffects>
+            </a:ext>
+          </a:extLst>
         </p:spPr>
       </p:pic>
     </p:spTree>
@@ -5746,76 +6096,8 @@
 </p:sld>
 </file>
 
-<file path=ppt/slides/slide7.xml><?xml version="1.0" encoding="utf-8"?>
-<p:sld xmlns:a="http://schemas.openxmlformats.org/drawingml/2006/main" xmlns:r="http://schemas.openxmlformats.org/officeDocument/2006/relationships" xmlns:mc="http://schemas.openxmlformats.org/markup-compatibility/2006" xmlns:mv="urn:schemas-microsoft-com:mac:vml" xmlns:p="http://schemas.openxmlformats.org/presentationml/2006/main" mc:Ignorable="mv" mc:PreserveAttributes="mv:*">
-  <p:cSld>
-    <p:spTree>
-      <p:nvGrpSpPr>
-        <p:cNvPr id="1" name=""/>
-        <p:cNvGrpSpPr/>
-        <p:nvPr/>
-      </p:nvGrpSpPr>
-      <p:grpSpPr>
-        <a:xfrm>
-          <a:off x="0" y="0"/>
-          <a:ext cx="0" cy="0"/>
-          <a:chOff x="0" y="0"/>
-          <a:chExt cx="0" cy="0"/>
-        </a:xfrm>
-      </p:grpSpPr>
-      <p:sp>
-        <p:nvSpPr>
-          <p:cNvPr id="2" name="Title 1"/>
-          <p:cNvSpPr>
-            <a:spLocks noGrp="1"/>
-          </p:cNvSpPr>
-          <p:nvPr>
-            <p:ph type="title"/>
-          </p:nvPr>
-        </p:nvSpPr>
-        <p:spPr/>
-        <p:txBody>
-          <a:bodyPr/>
-          <a:lstStyle/>
-          <a:p>
-            <a:endParaRPr lang="en-US" dirty="0"/>
-          </a:p>
-        </p:txBody>
-      </p:sp>
-      <p:pic>
-        <p:nvPicPr>
-          <p:cNvPr id="5" name="Picture 4" descr="trained_robot_behavior_results_lower_error.png"/>
-          <p:cNvPicPr>
-            <a:picLocks noChangeAspect="1"/>
-          </p:cNvPicPr>
-          <p:nvPr/>
-        </p:nvPicPr>
-        <p:blipFill>
-          <a:blip r:embed="rId2"/>
-          <a:stretch>
-            <a:fillRect/>
-          </a:stretch>
-        </p:blipFill>
-        <p:spPr>
-          <a:xfrm>
-            <a:off x="0" y="0"/>
-            <a:ext cx="9144000" cy="6857999"/>
-          </a:xfrm>
-          <a:prstGeom prst="rect">
-            <a:avLst/>
-          </a:prstGeom>
-        </p:spPr>
-      </p:pic>
-    </p:spTree>
-  </p:cSld>
-  <p:clrMapOvr>
-    <a:masterClrMapping/>
-  </p:clrMapOvr>
-</p:sld>
-</file>
-
-<file path=ppt/slides/slide8.xml><?xml version="1.0" encoding="utf-8"?>
-<p:sld xmlns:a="http://schemas.openxmlformats.org/drawingml/2006/main" xmlns:r="http://schemas.openxmlformats.org/officeDocument/2006/relationships" xmlns:mc="http://schemas.openxmlformats.org/markup-compatibility/2006" xmlns:mv="urn:schemas-microsoft-com:mac:vml" xmlns:p="http://schemas.openxmlformats.org/presentationml/2006/main" mc:Ignorable="mv" mc:PreserveAttributes="mv:*">
+<file path=ppt/slides/slide9.xml><?xml version="1.0" encoding="utf-8"?>
+<p:sld xmlns:a="http://schemas.openxmlformats.org/drawingml/2006/main" xmlns:r="http://schemas.openxmlformats.org/officeDocument/2006/relationships" xmlns:p="http://schemas.openxmlformats.org/presentationml/2006/main">
   <p:cSld>
     <p:spTree>
       <p:nvGrpSpPr>

</xml_diff>

<commit_message>
commented the code and slide changes.
</commit_message>
<xml_diff>
--- a/src/WellBehavedRobot.pptx
+++ b/src/WellBehavedRobot.pptx
@@ -14,6 +14,7 @@
     <p:sldId id="260" r:id="rId8"/>
     <p:sldId id="263" r:id="rId9"/>
     <p:sldId id="264" r:id="rId10"/>
+    <p:sldId id="268" r:id="rId11"/>
   </p:sldIdLst>
   <p:sldSz cx="9144000" cy="6858000" type="screen4x3"/>
   <p:notesSz cx="6858000" cy="9144000"/>
@@ -3854,6 +3855,146 @@
   <p:clrMapOvr>
     <a:masterClrMapping/>
   </p:clrMapOvr>
+  <p:timing>
+    <p:tnLst>
+      <p:par>
+        <p:cTn id="1" dur="indefinite" restart="never" nodeType="tmRoot"/>
+      </p:par>
+    </p:tnLst>
+  </p:timing>
+</p:sld>
+</file>
+
+<file path=ppt/slides/slide10.xml><?xml version="1.0" encoding="utf-8"?>
+<p:sld xmlns:a="http://schemas.openxmlformats.org/drawingml/2006/main" xmlns:r="http://schemas.openxmlformats.org/officeDocument/2006/relationships" xmlns:p="http://schemas.openxmlformats.org/presentationml/2006/main">
+  <p:cSld>
+    <p:spTree>
+      <p:nvGrpSpPr>
+        <p:cNvPr id="1" name=""/>
+        <p:cNvGrpSpPr/>
+        <p:nvPr/>
+      </p:nvGrpSpPr>
+      <p:grpSpPr>
+        <a:xfrm>
+          <a:off x="0" y="0"/>
+          <a:ext cx="0" cy="0"/>
+          <a:chOff x="0" y="0"/>
+          <a:chExt cx="0" cy="0"/>
+        </a:xfrm>
+      </p:grpSpPr>
+      <p:sp>
+        <p:nvSpPr>
+          <p:cNvPr id="2" name="Title 1"/>
+          <p:cNvSpPr>
+            <a:spLocks noGrp="1"/>
+          </p:cNvSpPr>
+          <p:nvPr>
+            <p:ph type="title"/>
+          </p:nvPr>
+        </p:nvSpPr>
+        <p:spPr/>
+        <p:txBody>
+          <a:bodyPr/>
+          <a:lstStyle/>
+          <a:p>
+            <a:r>
+              <a:rPr lang="en-US" dirty="0" smtClean="0"/>
+              <a:t>Lessons Learned</a:t>
+            </a:r>
+            <a:endParaRPr lang="en-US" dirty="0"/>
+          </a:p>
+        </p:txBody>
+      </p:sp>
+      <p:sp>
+        <p:nvSpPr>
+          <p:cNvPr id="3" name="Content Placeholder 2"/>
+          <p:cNvSpPr>
+            <a:spLocks noGrp="1"/>
+          </p:cNvSpPr>
+          <p:nvPr>
+            <p:ph idx="1"/>
+          </p:nvPr>
+        </p:nvSpPr>
+        <p:spPr/>
+        <p:txBody>
+          <a:bodyPr>
+            <a:normAutofit fontScale="92500" lnSpcReduction="10000"/>
+          </a:bodyPr>
+          <a:lstStyle/>
+          <a:p>
+            <a:r>
+              <a:rPr lang="en-US" dirty="0" smtClean="0"/>
+              <a:t>Architecture matters</a:t>
+            </a:r>
+          </a:p>
+          <a:p>
+            <a:pPr lvl="1"/>
+            <a:r>
+              <a:rPr lang="en-US" dirty="0" smtClean="0"/>
+              <a:t>Having 2 hidden layers increased training time</a:t>
+            </a:r>
+          </a:p>
+          <a:p>
+            <a:pPr lvl="1"/>
+            <a:r>
+              <a:rPr lang="en-US" dirty="0" smtClean="0"/>
+              <a:t>Number of neurons in hidden layer matters</a:t>
+            </a:r>
+          </a:p>
+          <a:p>
+            <a:pPr lvl="2"/>
+            <a:r>
+              <a:rPr lang="en-US" dirty="0" smtClean="0"/>
+              <a:t>Too few will not converge</a:t>
+            </a:r>
+          </a:p>
+          <a:p>
+            <a:pPr lvl="2"/>
+            <a:r>
+              <a:rPr lang="en-US" dirty="0" smtClean="0"/>
+              <a:t>Too many takes longer to train</a:t>
+            </a:r>
+          </a:p>
+          <a:p>
+            <a:r>
+              <a:rPr lang="en-US" dirty="0" smtClean="0"/>
+              <a:t>Saving and loading Neural Net is VITAL</a:t>
+            </a:r>
+          </a:p>
+          <a:p>
+            <a:pPr lvl="1"/>
+            <a:r>
+              <a:rPr lang="en-US" dirty="0" smtClean="0"/>
+              <a:t>Data sets</a:t>
+            </a:r>
+          </a:p>
+          <a:p>
+            <a:r>
+              <a:rPr lang="en-US" dirty="0" smtClean="0"/>
+              <a:t>For </a:t>
+            </a:r>
+            <a:r>
+              <a:rPr lang="en-US" dirty="0" err="1" smtClean="0"/>
+              <a:t>Backpropagation</a:t>
+            </a:r>
+            <a:r>
+              <a:rPr lang="en-US" dirty="0" smtClean="0"/>
+              <a:t> Training activation functions must be differentiable </a:t>
+            </a:r>
+            <a:endParaRPr lang="en-US" dirty="0"/>
+          </a:p>
+        </p:txBody>
+      </p:sp>
+    </p:spTree>
+    <p:extLst>
+      <p:ext uri="{BB962C8B-B14F-4D97-AF65-F5344CB8AC3E}">
+        <p14:creationId xmlns:p14="http://schemas.microsoft.com/office/powerpoint/2010/main" val="886389394"/>
+      </p:ext>
+    </p:extLst>
+  </p:cSld>
+  <p:clrMapOvr>
+    <a:masterClrMapping/>
+  </p:clrMapOvr>
 </p:sld>
 </file>
 
@@ -3977,6 +4118,13 @@
   <p:clrMapOvr>
     <a:masterClrMapping/>
   </p:clrMapOvr>
+  <p:timing>
+    <p:tnLst>
+      <p:par>
+        <p:cTn id="1" dur="indefinite" restart="never" nodeType="tmRoot"/>
+      </p:par>
+    </p:tnLst>
+  </p:timing>
 </p:sld>
 </file>
 
@@ -4078,6 +4226,13 @@
   <p:clrMapOvr>
     <a:masterClrMapping/>
   </p:clrMapOvr>
+  <p:timing>
+    <p:tnLst>
+      <p:par>
+        <p:cTn id="1" dur="indefinite" restart="never" nodeType="tmRoot"/>
+      </p:par>
+    </p:tnLst>
+  </p:timing>
 </p:sld>
 </file>
 
@@ -4188,6 +4343,13 @@
   <p:clrMapOvr>
     <a:masterClrMapping/>
   </p:clrMapOvr>
+  <p:timing>
+    <p:tnLst>
+      <p:par>
+        <p:cTn id="1" dur="indefinite" restart="never" nodeType="tmRoot"/>
+      </p:par>
+    </p:tnLst>
+  </p:timing>
 </p:sld>
 </file>
 
@@ -4315,6 +4477,13 @@
   <p:clrMapOvr>
     <a:masterClrMapping/>
   </p:clrMapOvr>
+  <p:timing>
+    <p:tnLst>
+      <p:par>
+        <p:cTn id="1" dur="indefinite" restart="never" nodeType="tmRoot"/>
+      </p:par>
+    </p:tnLst>
+  </p:timing>
 </p:sld>
 </file>
 
@@ -4395,41 +4564,21 @@
           <a:p>
             <a:r>
               <a:rPr lang="en-US" dirty="0" smtClean="0"/>
-              <a:t>If a vampire enters the room stab it in the heart (real vampires are dangerous parasites no matter what Twilight would have you think) </a:t>
-            </a:r>
-          </a:p>
-          <a:p>
+              <a:t>If a vampire enters </a:t>
+            </a:r>
+            <a:r>
+              <a:rPr lang="en-US" smtClean="0"/>
+              <a:t>the room yell and </a:t>
+            </a:r>
             <a:r>
               <a:rPr lang="en-US" dirty="0" smtClean="0"/>
-              <a:t>If a werewolf </a:t>
-            </a:r>
+              <a:t>stab it in the heart (real vampires are dangerous parasites no matter what Twilight would have you think) </a:t>
+            </a:r>
+          </a:p>
+          <a:p>
             <a:r>
               <a:rPr lang="en-US" dirty="0" smtClean="0"/>
-              <a:t>enters the room </a:t>
-            </a:r>
-            <a:r>
-              <a:rPr lang="en-US" dirty="0" smtClean="0"/>
-              <a:t>yell for help and </a:t>
-            </a:r>
-            <a:r>
-              <a:rPr lang="en-US" dirty="0" smtClean="0"/>
-              <a:t>RUN AWAY</a:t>
-            </a:r>
-            <a:r>
-              <a:rPr lang="en-US" dirty="0" smtClean="0"/>
-              <a:t>. </a:t>
-            </a:r>
-            <a:r>
-              <a:rPr lang="en-US" dirty="0" smtClean="0"/>
-              <a:t>(Werewolves have a habit of destroying </a:t>
-            </a:r>
-            <a:r>
-              <a:rPr lang="en-US" dirty="0" smtClean="0"/>
-              <a:t>robots and the </a:t>
-            </a:r>
-            <a:r>
-              <a:rPr lang="en-US" dirty="0" smtClean="0"/>
-              <a:t>repairs are costly)</a:t>
+              <a:t>If a werewolf enters the room yell for help and RUN AWAY. (Werewolves have a habit of destroying robots and the repairs are costly)</a:t>
             </a:r>
             <a:endParaRPr lang="en-US" dirty="0"/>
           </a:p>
@@ -4440,6 +4589,13 @@
   <p:clrMapOvr>
     <a:masterClrMapping/>
   </p:clrMapOvr>
+  <p:timing>
+    <p:tnLst>
+      <p:par>
+        <p:cTn id="1" dur="indefinite" restart="never" nodeType="tmRoot"/>
+      </p:par>
+    </p:tnLst>
+  </p:timing>
 </p:sld>
 </file>
 
@@ -5983,6 +6139,13 @@
   <p:clrMapOvr>
     <a:masterClrMapping/>
   </p:clrMapOvr>
+  <p:timing>
+    <p:tnLst>
+      <p:par>
+        <p:cTn id="1" dur="indefinite" restart="never" nodeType="tmRoot"/>
+      </p:par>
+    </p:tnLst>
+  </p:timing>
 </p:sld>
 </file>
 
@@ -6093,6 +6256,13 @@
   <p:clrMapOvr>
     <a:masterClrMapping/>
   </p:clrMapOvr>
+  <p:timing>
+    <p:tnLst>
+      <p:par>
+        <p:cTn id="1" dur="indefinite" restart="never" nodeType="tmRoot"/>
+      </p:par>
+    </p:tnLst>
+  </p:timing>
 </p:sld>
 </file>
 
@@ -6141,6 +6311,13 @@
   <p:clrMapOvr>
     <a:masterClrMapping/>
   </p:clrMapOvr>
+  <p:timing>
+    <p:tnLst>
+      <p:par>
+        <p:cTn id="1" dur="indefinite" restart="never" nodeType="tmRoot"/>
+      </p:par>
+    </p:tnLst>
+  </p:timing>
 </p:sld>
 </file>
 

</xml_diff>